<commit_message>
Re-plot figures after re-computation.
</commit_message>
<xml_diff>
--- a/Paper/Daigram4.pptx
+++ b/Paper/Daigram4.pptx
@@ -1792,11 +1792,11 @@
           <c:showPercent val="0"/>
           <c:showBubbleSize val="0"/>
         </c:dLbls>
-        <c:axId val="146149312"/>
-        <c:axId val="128983616"/>
+        <c:axId val="133077760"/>
+        <c:axId val="133078336"/>
       </c:scatterChart>
       <c:valAx>
-        <c:axId val="146149312"/>
+        <c:axId val="133077760"/>
         <c:scaling>
           <c:orientation val="minMax"/>
         </c:scaling>
@@ -1840,12 +1840,12 @@
         <c:majorTickMark val="out"/>
         <c:minorTickMark val="none"/>
         <c:tickLblPos val="nextTo"/>
-        <c:crossAx val="128983616"/>
+        <c:crossAx val="133078336"/>
         <c:crossesAt val="-0.1"/>
         <c:crossBetween val="midCat"/>
       </c:valAx>
       <c:valAx>
-        <c:axId val="128983616"/>
+        <c:axId val="133078336"/>
         <c:scaling>
           <c:orientation val="minMax"/>
         </c:scaling>
@@ -1876,7 +1876,7 @@
         <c:majorTickMark val="out"/>
         <c:minorTickMark val="none"/>
         <c:tickLblPos val="nextTo"/>
-        <c:crossAx val="146149312"/>
+        <c:crossAx val="133077760"/>
         <c:crosses val="autoZero"/>
         <c:crossBetween val="midCat"/>
       </c:valAx>
@@ -2089,7 +2089,7 @@
           <a:p>
             <a:fld id="{6688637F-0B46-460F-9E8C-37D741709E2C}" type="datetimeFigureOut">
               <a:rPr lang="en-US" smtClean="0"/>
-              <a:t>2/7/2015</a:t>
+              <a:t>2/16/2015</a:t>
             </a:fld>
             <a:endParaRPr lang="en-US"/>
           </a:p>
@@ -2259,7 +2259,7 @@
           <a:p>
             <a:fld id="{6688637F-0B46-460F-9E8C-37D741709E2C}" type="datetimeFigureOut">
               <a:rPr lang="en-US" smtClean="0"/>
-              <a:t>2/7/2015</a:t>
+              <a:t>2/16/2015</a:t>
             </a:fld>
             <a:endParaRPr lang="en-US"/>
           </a:p>
@@ -2439,7 +2439,7 @@
           <a:p>
             <a:fld id="{6688637F-0B46-460F-9E8C-37D741709E2C}" type="datetimeFigureOut">
               <a:rPr lang="en-US" smtClean="0"/>
-              <a:t>2/7/2015</a:t>
+              <a:t>2/16/2015</a:t>
             </a:fld>
             <a:endParaRPr lang="en-US"/>
           </a:p>
@@ -2609,7 +2609,7 @@
           <a:p>
             <a:fld id="{6688637F-0B46-460F-9E8C-37D741709E2C}" type="datetimeFigureOut">
               <a:rPr lang="en-US" smtClean="0"/>
-              <a:t>2/7/2015</a:t>
+              <a:t>2/16/2015</a:t>
             </a:fld>
             <a:endParaRPr lang="en-US"/>
           </a:p>
@@ -2855,7 +2855,7 @@
           <a:p>
             <a:fld id="{6688637F-0B46-460F-9E8C-37D741709E2C}" type="datetimeFigureOut">
               <a:rPr lang="en-US" smtClean="0"/>
-              <a:t>2/7/2015</a:t>
+              <a:t>2/16/2015</a:t>
             </a:fld>
             <a:endParaRPr lang="en-US"/>
           </a:p>
@@ -3143,7 +3143,7 @@
           <a:p>
             <a:fld id="{6688637F-0B46-460F-9E8C-37D741709E2C}" type="datetimeFigureOut">
               <a:rPr lang="en-US" smtClean="0"/>
-              <a:t>2/7/2015</a:t>
+              <a:t>2/16/2015</a:t>
             </a:fld>
             <a:endParaRPr lang="en-US"/>
           </a:p>
@@ -3565,7 +3565,7 @@
           <a:p>
             <a:fld id="{6688637F-0B46-460F-9E8C-37D741709E2C}" type="datetimeFigureOut">
               <a:rPr lang="en-US" smtClean="0"/>
-              <a:t>2/7/2015</a:t>
+              <a:t>2/16/2015</a:t>
             </a:fld>
             <a:endParaRPr lang="en-US"/>
           </a:p>
@@ -3683,7 +3683,7 @@
           <a:p>
             <a:fld id="{6688637F-0B46-460F-9E8C-37D741709E2C}" type="datetimeFigureOut">
               <a:rPr lang="en-US" smtClean="0"/>
-              <a:t>2/7/2015</a:t>
+              <a:t>2/16/2015</a:t>
             </a:fld>
             <a:endParaRPr lang="en-US"/>
           </a:p>
@@ -3778,7 +3778,7 @@
           <a:p>
             <a:fld id="{6688637F-0B46-460F-9E8C-37D741709E2C}" type="datetimeFigureOut">
               <a:rPr lang="en-US" smtClean="0"/>
-              <a:t>2/7/2015</a:t>
+              <a:t>2/16/2015</a:t>
             </a:fld>
             <a:endParaRPr lang="en-US"/>
           </a:p>
@@ -4055,7 +4055,7 @@
           <a:p>
             <a:fld id="{6688637F-0B46-460F-9E8C-37D741709E2C}" type="datetimeFigureOut">
               <a:rPr lang="en-US" smtClean="0"/>
-              <a:t>2/7/2015</a:t>
+              <a:t>2/16/2015</a:t>
             </a:fld>
             <a:endParaRPr lang="en-US"/>
           </a:p>
@@ -4308,7 +4308,7 @@
           <a:p>
             <a:fld id="{6688637F-0B46-460F-9E8C-37D741709E2C}" type="datetimeFigureOut">
               <a:rPr lang="en-US" smtClean="0"/>
-              <a:t>2/7/2015</a:t>
+              <a:t>2/16/2015</a:t>
             </a:fld>
             <a:endParaRPr lang="en-US"/>
           </a:p>
@@ -4521,7 +4521,7 @@
           <a:p>
             <a:fld id="{6688637F-0B46-460F-9E8C-37D741709E2C}" type="datetimeFigureOut">
               <a:rPr lang="en-US" smtClean="0"/>
-              <a:t>2/7/2015</a:t>
+              <a:t>2/16/2015</a:t>
             </a:fld>
             <a:endParaRPr lang="en-US"/>
           </a:p>
@@ -4905,7 +4905,7 @@
           <p:nvPr>
             <p:extLst>
               <p:ext uri="{D42A27DB-BD31-4B8C-83A1-F6EECF244321}">
-                <p14:modId xmlns:p14="http://schemas.microsoft.com/office/powerpoint/2010/main" val="2144017082"/>
+                <p14:modId xmlns:p14="http://schemas.microsoft.com/office/powerpoint/2010/main" val="3422612599"/>
               </p:ext>
             </p:extLst>
           </p:nvPr>

</xml_diff>